<commit_message>
shuffled exercise 2 logic around, added more stuff to the spec.
</commit_message>
<xml_diff>
--- a/Entelect Dojo Unit Testing.pptx
+++ b/Entelect Dojo Unit Testing.pptx
@@ -120,7 +120,7 @@
   </p:defaultTextStyle>
   <p:extLst>
     <p:ext uri="{EFAFB233-063F-42B5-8137-9DF3F51BA10A}">
-      <p15:sldGuideLst xmlns:p15="http://schemas.microsoft.com/office/powerpoint/2012/main">
+      <p15:sldGuideLst xmlns:p15="http://schemas.microsoft.com/office/powerpoint/2012/main" xmlns="">
         <p15:guide id="1" orient="horz" pos="1800">
           <p15:clr>
             <a:srgbClr val="A4A3A4"/>
@@ -134,7 +134,7 @@
       </p15:sldGuideLst>
     </p:ext>
     <p:ext uri="{2D200454-40CA-4A62-9FC3-DE9A4176ACB9}">
-      <p15:notesGuideLst xmlns:p15="http://schemas.microsoft.com/office/powerpoint/2012/main">
+      <p15:notesGuideLst xmlns:p15="http://schemas.microsoft.com/office/powerpoint/2012/main" xmlns="">
         <p15:guide id="1" orient="horz" pos="2880">
           <p15:clr>
             <a:srgbClr val="A4A3A4"/>
@@ -234,7 +234,7 @@
             <a:fld id="{2280EABA-BA46-4977-A468-5BA52A04D625}" type="datetimeFigureOut">
               <a:rPr lang="en-US" smtClean="0"/>
               <a:pPr/>
-              <a:t>5/27/2016</a:t>
+              <a:t>6/8/2016</a:t>
             </a:fld>
             <a:endParaRPr lang="en-US"/>
           </a:p>
@@ -401,7 +401,7 @@
             <a:fld id="{D9A4A4D6-0EB0-423B-8417-AC0C87E5E672}" type="datetimeFigureOut">
               <a:rPr lang="en-ZA" smtClean="0"/>
               <a:pPr/>
-              <a:t>2016/05/27</a:t>
+              <a:t>2016/06/08</a:t>
             </a:fld>
             <a:endParaRPr lang="en-ZA"/>
           </a:p>
@@ -1540,7 +1540,7 @@
             <a:fld id="{986C9EB5-A2B4-494A-8466-BDB12800E3A8}" type="datetimeFigureOut">
               <a:rPr lang="en-ZA" smtClean="0"/>
               <a:pPr/>
-              <a:t>2016/05/27</a:t>
+              <a:t>2016/06/08</a:t>
             </a:fld>
             <a:endParaRPr lang="en-ZA"/>
           </a:p>
@@ -1736,7 +1736,7 @@
             <a:fld id="{986C9EB5-A2B4-494A-8466-BDB12800E3A8}" type="datetimeFigureOut">
               <a:rPr lang="en-ZA" smtClean="0"/>
               <a:pPr/>
-              <a:t>2016/05/27</a:t>
+              <a:t>2016/06/08</a:t>
             </a:fld>
             <a:endParaRPr lang="en-ZA"/>
           </a:p>
@@ -1949,7 +1949,7 @@
             <a:fld id="{986C9EB5-A2B4-494A-8466-BDB12800E3A8}" type="datetimeFigureOut">
               <a:rPr lang="en-ZA" smtClean="0"/>
               <a:pPr/>
-              <a:t>2016/05/27</a:t>
+              <a:t>2016/06/08</a:t>
             </a:fld>
             <a:endParaRPr lang="en-ZA"/>
           </a:p>
@@ -2428,7 +2428,7 @@
             <a:fld id="{986C9EB5-A2B4-494A-8466-BDB12800E3A8}" type="datetimeFigureOut">
               <a:rPr lang="en-ZA" smtClean="0"/>
               <a:pPr/>
-              <a:t>2016/05/27</a:t>
+              <a:t>2016/06/08</a:t>
             </a:fld>
             <a:endParaRPr lang="en-ZA" dirty="0"/>
           </a:p>
@@ -2721,7 +2721,7 @@
             <a:fld id="{986C9EB5-A2B4-494A-8466-BDB12800E3A8}" type="datetimeFigureOut">
               <a:rPr lang="en-ZA" smtClean="0"/>
               <a:pPr/>
-              <a:t>2016/05/27</a:t>
+              <a:t>2016/06/08</a:t>
             </a:fld>
             <a:endParaRPr lang="en-ZA"/>
           </a:p>
@@ -3035,7 +3035,7 @@
             <a:fld id="{986C9EB5-A2B4-494A-8466-BDB12800E3A8}" type="datetimeFigureOut">
               <a:rPr lang="en-ZA" smtClean="0"/>
               <a:pPr/>
-              <a:t>2016/05/27</a:t>
+              <a:t>2016/06/08</a:t>
             </a:fld>
             <a:endParaRPr lang="en-ZA"/>
           </a:p>
@@ -3483,7 +3483,7 @@
             <a:fld id="{986C9EB5-A2B4-494A-8466-BDB12800E3A8}" type="datetimeFigureOut">
               <a:rPr lang="en-ZA" smtClean="0"/>
               <a:pPr/>
-              <a:t>2016/05/27</a:t>
+              <a:t>2016/06/08</a:t>
             </a:fld>
             <a:endParaRPr lang="en-ZA"/>
           </a:p>
@@ -3627,7 +3627,7 @@
             <a:fld id="{986C9EB5-A2B4-494A-8466-BDB12800E3A8}" type="datetimeFigureOut">
               <a:rPr lang="en-ZA" smtClean="0"/>
               <a:pPr/>
-              <a:t>2016/05/27</a:t>
+              <a:t>2016/06/08</a:t>
             </a:fld>
             <a:endParaRPr lang="en-ZA"/>
           </a:p>
@@ -3755,7 +3755,7 @@
             <a:fld id="{986C9EB5-A2B4-494A-8466-BDB12800E3A8}" type="datetimeFigureOut">
               <a:rPr lang="en-ZA" smtClean="0"/>
               <a:pPr/>
-              <a:t>2016/05/27</a:t>
+              <a:t>2016/06/08</a:t>
             </a:fld>
             <a:endParaRPr lang="en-ZA"/>
           </a:p>
@@ -4065,7 +4065,7 @@
             <a:fld id="{986C9EB5-A2B4-494A-8466-BDB12800E3A8}" type="datetimeFigureOut">
               <a:rPr lang="en-ZA" smtClean="0"/>
               <a:pPr/>
-              <a:t>2016/05/27</a:t>
+              <a:t>2016/06/08</a:t>
             </a:fld>
             <a:endParaRPr lang="en-ZA"/>
           </a:p>
@@ -4351,7 +4351,7 @@
             <a:fld id="{986C9EB5-A2B4-494A-8466-BDB12800E3A8}" type="datetimeFigureOut">
               <a:rPr lang="en-ZA" smtClean="0"/>
               <a:pPr/>
-              <a:t>2016/05/27</a:t>
+              <a:t>2016/06/08</a:t>
             </a:fld>
             <a:endParaRPr lang="en-ZA"/>
           </a:p>
@@ -5407,6 +5407,57 @@
             </a:r>
           </a:p>
           <a:p>
+            <a:pPr lvl="2"/>
+            <a:r>
+              <a:rPr lang="en-ZA" dirty="0" err="1" smtClean="0"/>
+              <a:t>assertNotNull</a:t>
+            </a:r>
+            <a:r>
+              <a:rPr lang="en-ZA" dirty="0" smtClean="0"/>
+              <a:t>(</a:t>
+            </a:r>
+            <a:r>
+              <a:rPr lang="en-ZA" dirty="0" err="1" smtClean="0"/>
+              <a:t>newObject</a:t>
+            </a:r>
+            <a:r>
+              <a:rPr lang="en-ZA" dirty="0" smtClean="0"/>
+              <a:t>)</a:t>
+            </a:r>
+            <a:endParaRPr lang="en-ZA" dirty="0" smtClean="0"/>
+          </a:p>
+          <a:p>
+            <a:pPr lvl="2"/>
+            <a:r>
+              <a:rPr lang="en-ZA" dirty="0" err="1" smtClean="0"/>
+              <a:t>assertTrue</a:t>
+            </a:r>
+            <a:r>
+              <a:rPr lang="en-ZA" dirty="0" smtClean="0"/>
+              <a:t>(</a:t>
+            </a:r>
+            <a:r>
+              <a:rPr lang="en-ZA" dirty="0" err="1" smtClean="0"/>
+              <a:t>isValid</a:t>
+            </a:r>
+            <a:r>
+              <a:rPr lang="en-ZA" dirty="0" smtClean="0"/>
+              <a:t>)</a:t>
+            </a:r>
+          </a:p>
+          <a:p>
+            <a:pPr lvl="2"/>
+            <a:r>
+              <a:rPr lang="en-ZA" dirty="0" err="1" smtClean="0"/>
+              <a:t>assertEquals</a:t>
+            </a:r>
+            <a:r>
+              <a:rPr lang="en-ZA" dirty="0" smtClean="0"/>
+              <a:t>(“count not 20”, EXPECTED_COUNT, 20);</a:t>
+            </a:r>
+            <a:endParaRPr lang="en-ZA" dirty="0" smtClean="0"/>
+          </a:p>
+          <a:p>
             <a:r>
               <a:rPr lang="en-ZA" dirty="0" smtClean="0"/>
               <a:t>Before &amp; After tests</a:t>
@@ -5778,9 +5829,6 @@
               </a:rPr>
               <a:t>Verify</a:t>
             </a:r>
-            <a:endParaRPr lang="en-ZA" dirty="0" smtClean="0">
-              <a:sym typeface="Wingdings" panose="05000000000000000000" pitchFamily="2" charset="2"/>
-            </a:endParaRPr>
           </a:p>
           <a:p>
             <a:endParaRPr lang="en-ZA" dirty="0" smtClean="0">

</xml_diff>